<commit_message>
update with minor fixes
</commit_message>
<xml_diff>
--- a/slides/Online/2020/03a - ObjectsMethods.pptx
+++ b/slides/Online/2020/03a - ObjectsMethods.pptx
@@ -5,19 +5,18 @@
     <p:sldMasterId id="2147483648" r:id="rId1"/>
   </p:sldMasterIdLst>
   <p:notesMasterIdLst>
-    <p:notesMasterId r:id="rId9"/>
+    <p:notesMasterId r:id="rId8"/>
   </p:notesMasterIdLst>
   <p:handoutMasterIdLst>
-    <p:handoutMasterId r:id="rId10"/>
+    <p:handoutMasterId r:id="rId9"/>
   </p:handoutMasterIdLst>
   <p:sldIdLst>
     <p:sldId id="256" r:id="rId2"/>
-    <p:sldId id="257" r:id="rId3"/>
-    <p:sldId id="258" r:id="rId4"/>
-    <p:sldId id="259" r:id="rId5"/>
-    <p:sldId id="261" r:id="rId6"/>
-    <p:sldId id="262" r:id="rId7"/>
-    <p:sldId id="263" r:id="rId8"/>
+    <p:sldId id="258" r:id="rId3"/>
+    <p:sldId id="259" r:id="rId4"/>
+    <p:sldId id="261" r:id="rId5"/>
+    <p:sldId id="262" r:id="rId6"/>
+    <p:sldId id="263" r:id="rId7"/>
   </p:sldIdLst>
   <p:sldSz cx="13817600" cy="7772400"/>
   <p:notesSz cx="6858000" cy="9144000"/>
@@ -6694,14 +6693,14 @@
   <p:clrMapOvr>
     <a:masterClrMapping/>
   </p:clrMapOvr>
-  <mc:AlternateContent xmlns:mc="http://schemas.openxmlformats.org/markup-compatibility/2006" xmlns:p14="http://schemas.microsoft.com/office/powerpoint/2010/main">
-    <mc:Choice Requires="p14">
-      <p:transition p14:dur="300">
+  <mc:AlternateContent xmlns:mc="http://schemas.openxmlformats.org/markup-compatibility/2006">
+    <mc:Choice xmlns:p14="http://schemas.microsoft.com/office/powerpoint/2010/main" Requires="p14">
+      <p:transition p14:dur="300" advTm="124050">
         <p:fade/>
       </p:transition>
     </mc:Choice>
-    <mc:Fallback xmlns="">
-      <p:transition>
+    <mc:Fallback>
+      <p:transition advTm="124050">
         <p:fade/>
       </p:transition>
     </mc:Fallback>
@@ -6710,481 +6709,6 @@
 </file>
 
 <file path=ppt/slides/slide2.xml><?xml version="1.0" encoding="utf-8"?>
-<p:sld xmlns:a="http://schemas.openxmlformats.org/drawingml/2006/main" xmlns:r="http://schemas.openxmlformats.org/officeDocument/2006/relationships" xmlns:p="http://schemas.openxmlformats.org/presentationml/2006/main">
-  <p:cSld>
-    <p:spTree>
-      <p:nvGrpSpPr>
-        <p:cNvPr id="1" name=""/>
-        <p:cNvGrpSpPr/>
-        <p:nvPr/>
-      </p:nvGrpSpPr>
-      <p:grpSpPr>
-        <a:xfrm>
-          <a:off x="0" y="0"/>
-          <a:ext cx="0" cy="0"/>
-          <a:chOff x="0" y="0"/>
-          <a:chExt cx="0" cy="0"/>
-        </a:xfrm>
-      </p:grpSpPr>
-      <p:sp>
-        <p:nvSpPr>
-          <p:cNvPr id="4" name="Title 3">
-            <a:extLst>
-              <a:ext uri="{FF2B5EF4-FFF2-40B4-BE49-F238E27FC236}">
-                <a16:creationId xmlns:a16="http://schemas.microsoft.com/office/drawing/2014/main" id="{B912DD63-04F0-4148-98AD-8E50B5532C91}"/>
-              </a:ext>
-            </a:extLst>
-          </p:cNvPr>
-          <p:cNvSpPr>
-            <a:spLocks noGrp="1"/>
-          </p:cNvSpPr>
-          <p:nvPr>
-            <p:ph type="title"/>
-          </p:nvPr>
-        </p:nvSpPr>
-        <p:spPr>
-          <a:xfrm>
-            <a:off x="628075" y="905259"/>
-            <a:ext cx="12561453" cy="1015663"/>
-          </a:xfrm>
-        </p:spPr>
-        <p:txBody>
-          <a:bodyPr/>
-          <a:lstStyle/>
-          <a:p>
-            <a:r>
-              <a:rPr lang="en-US" dirty="0"/>
-              <a:t>Primitive and Object Types</a:t>
-            </a:r>
-          </a:p>
-        </p:txBody>
-      </p:sp>
-      <p:sp>
-        <p:nvSpPr>
-          <p:cNvPr id="5" name="Text Placeholder 4">
-            <a:extLst>
-              <a:ext uri="{FF2B5EF4-FFF2-40B4-BE49-F238E27FC236}">
-                <a16:creationId xmlns:a16="http://schemas.microsoft.com/office/drawing/2014/main" id="{92F209D4-8AC1-9C4B-967C-B887BDCD13DC}"/>
-              </a:ext>
-            </a:extLst>
-          </p:cNvPr>
-          <p:cNvSpPr>
-            <a:spLocks noGrp="1"/>
-          </p:cNvSpPr>
-          <p:nvPr>
-            <p:ph type="body" sz="quarter" idx="10"/>
-          </p:nvPr>
-        </p:nvSpPr>
-        <p:spPr>
-          <a:xfrm>
-            <a:off x="628075" y="2126639"/>
-            <a:ext cx="6280725" cy="4919552"/>
-          </a:xfrm>
-        </p:spPr>
-        <p:txBody>
-          <a:bodyPr/>
-          <a:lstStyle/>
-          <a:p>
-            <a:r>
-              <a:rPr lang="en-US" dirty="0"/>
-              <a:t>Primitives</a:t>
-            </a:r>
-          </a:p>
-          <a:p>
-            <a:pPr lvl="1"/>
-            <a:r>
-              <a:rPr lang="en-US" dirty="0"/>
-              <a:t>int</a:t>
-            </a:r>
-          </a:p>
-          <a:p>
-            <a:pPr lvl="1"/>
-            <a:r>
-              <a:rPr lang="en-US" dirty="0"/>
-              <a:t>double</a:t>
-            </a:r>
-          </a:p>
-          <a:p>
-            <a:pPr lvl="1"/>
-            <a:r>
-              <a:rPr lang="en-US" dirty="0"/>
-              <a:t>char</a:t>
-            </a:r>
-          </a:p>
-          <a:p>
-            <a:pPr lvl="1"/>
-            <a:r>
-              <a:rPr lang="en-US" dirty="0"/>
-              <a:t>boolean</a:t>
-            </a:r>
-          </a:p>
-          <a:p>
-            <a:r>
-              <a:rPr lang="en-US" dirty="0"/>
-              <a:t>Store numbers only</a:t>
-            </a:r>
-          </a:p>
-          <a:p>
-            <a:pPr lvl="1"/>
-            <a:r>
-              <a:rPr lang="en-US" dirty="0"/>
-              <a:t>char maps </a:t>
-            </a:r>
-            <a:r>
-              <a:rPr lang="en-US" dirty="0" err="1"/>
-              <a:t>ints</a:t>
-            </a:r>
-            <a:r>
-              <a:rPr lang="en-US" dirty="0"/>
-              <a:t> to ASCII table</a:t>
-            </a:r>
-          </a:p>
-          <a:p>
-            <a:pPr lvl="1"/>
-            <a:r>
-              <a:rPr lang="en-US" dirty="0"/>
-              <a:t>boolean maps 0 to false, 1 to true</a:t>
-            </a:r>
-          </a:p>
-          <a:p>
-            <a:r>
-              <a:rPr lang="en-US" dirty="0"/>
-              <a:t>Only contains the values</a:t>
-            </a:r>
-          </a:p>
-          <a:p>
-            <a:pPr lvl="1"/>
-            <a:r>
-              <a:rPr lang="en-US" dirty="0"/>
-              <a:t>No functionality</a:t>
-            </a:r>
-          </a:p>
-          <a:p>
-            <a:pPr lvl="1"/>
-            <a:r>
-              <a:rPr lang="en-US" dirty="0"/>
-              <a:t>Repeat: values only </a:t>
-            </a:r>
-          </a:p>
-          <a:p>
-            <a:endParaRPr lang="en-US" dirty="0"/>
-          </a:p>
-        </p:txBody>
-      </p:sp>
-      <p:sp>
-        <p:nvSpPr>
-          <p:cNvPr id="6" name="Text Placeholder 4">
-            <a:extLst>
-              <a:ext uri="{FF2B5EF4-FFF2-40B4-BE49-F238E27FC236}">
-                <a16:creationId xmlns:a16="http://schemas.microsoft.com/office/drawing/2014/main" id="{50BF289A-FE41-6F43-B27F-9D0F4315E895}"/>
-              </a:ext>
-            </a:extLst>
-          </p:cNvPr>
-          <p:cNvSpPr txBox="1">
-            <a:spLocks/>
-          </p:cNvSpPr>
-          <p:nvPr/>
-        </p:nvSpPr>
-        <p:spPr>
-          <a:xfrm>
-            <a:off x="6908800" y="2126639"/>
-            <a:ext cx="6280725" cy="3202159"/>
-          </a:xfrm>
-          <a:prstGeom prst="rect">
-            <a:avLst/>
-          </a:prstGeom>
-        </p:spPr>
-        <p:txBody>
-          <a:bodyPr vert="horz" lIns="91440" tIns="91440" rIns="91440" bIns="91440" rtlCol="0">
-            <a:spAutoFit/>
-          </a:bodyPr>
-          <a:lstStyle>
-            <a:lvl1pPr marL="524712" indent="-524712" algn="l" defTabSz="699614" rtl="0" eaLnBrk="1" latinLnBrk="0" hangingPunct="1">
-              <a:lnSpc>
-                <a:spcPct val="120000"/>
-              </a:lnSpc>
-              <a:spcBef>
-                <a:spcPts val="600"/>
-              </a:spcBef>
-              <a:spcAft>
-                <a:spcPts val="600"/>
-              </a:spcAft>
-              <a:buFont typeface="Arial"/>
-              <a:buChar char="•"/>
-              <a:defRPr sz="1800" b="0" i="0" kern="1200">
-                <a:solidFill>
-                  <a:srgbClr val="092529"/>
-                </a:solidFill>
-                <a:latin typeface="Proxima Nova" charset="0"/>
-                <a:ea typeface="Proxima Nova" charset="0"/>
-                <a:cs typeface="Proxima Nova" charset="0"/>
-              </a:defRPr>
-            </a:lvl1pPr>
-            <a:lvl2pPr marL="1136875" indent="-437261" algn="l" defTabSz="699614" rtl="0" eaLnBrk="1" latinLnBrk="0" hangingPunct="1">
-              <a:lnSpc>
-                <a:spcPct val="120000"/>
-              </a:lnSpc>
-              <a:spcBef>
-                <a:spcPts val="0"/>
-              </a:spcBef>
-              <a:spcAft>
-                <a:spcPts val="600"/>
-              </a:spcAft>
-              <a:buFont typeface="Arial"/>
-              <a:buChar char="–"/>
-              <a:defRPr sz="1600" b="0" i="0" kern="1200">
-                <a:solidFill>
-                  <a:srgbClr val="092529"/>
-                </a:solidFill>
-                <a:latin typeface="Proxima Nova" charset="0"/>
-                <a:ea typeface="Proxima Nova" charset="0"/>
-                <a:cs typeface="Proxima Nova" charset="0"/>
-              </a:defRPr>
-            </a:lvl2pPr>
-            <a:lvl3pPr marL="1749040" indent="-349807" algn="l" defTabSz="699614" rtl="0" eaLnBrk="1" latinLnBrk="0" hangingPunct="1">
-              <a:lnSpc>
-                <a:spcPct val="120000"/>
-              </a:lnSpc>
-              <a:spcBef>
-                <a:spcPts val="0"/>
-              </a:spcBef>
-              <a:spcAft>
-                <a:spcPts val="600"/>
-              </a:spcAft>
-              <a:buFont typeface="Arial"/>
-              <a:buChar char="•"/>
-              <a:defRPr sz="1600" b="0" i="0" kern="1200">
-                <a:solidFill>
-                  <a:srgbClr val="092529"/>
-                </a:solidFill>
-                <a:latin typeface="Proxima Nova" charset="0"/>
-                <a:ea typeface="Proxima Nova" charset="0"/>
-                <a:cs typeface="Proxima Nova" charset="0"/>
-              </a:defRPr>
-            </a:lvl3pPr>
-            <a:lvl4pPr marL="2448655" indent="-349807" algn="l" defTabSz="699614" rtl="0" eaLnBrk="1" latinLnBrk="0" hangingPunct="1">
-              <a:lnSpc>
-                <a:spcPct val="120000"/>
-              </a:lnSpc>
-              <a:spcBef>
-                <a:spcPts val="0"/>
-              </a:spcBef>
-              <a:spcAft>
-                <a:spcPts val="600"/>
-              </a:spcAft>
-              <a:buFont typeface="Arial"/>
-              <a:buChar char="–"/>
-              <a:defRPr sz="1600" b="0" i="0" kern="1200">
-                <a:solidFill>
-                  <a:srgbClr val="092529"/>
-                </a:solidFill>
-                <a:latin typeface="Proxima Nova" charset="0"/>
-                <a:ea typeface="Proxima Nova" charset="0"/>
-                <a:cs typeface="Proxima Nova" charset="0"/>
-              </a:defRPr>
-            </a:lvl4pPr>
-            <a:lvl5pPr marL="3148272" indent="-349807" algn="l" defTabSz="699614" rtl="0" eaLnBrk="1" latinLnBrk="0" hangingPunct="1">
-              <a:spcBef>
-                <a:spcPct val="20000"/>
-              </a:spcBef>
-              <a:buFont typeface="Arial"/>
-              <a:buChar char="»"/>
-              <a:defRPr sz="1648" b="0" kern="1200">
-                <a:solidFill>
-                  <a:srgbClr val="092529"/>
-                </a:solidFill>
-                <a:latin typeface="Franklin Gothic Book" charset="0"/>
-                <a:ea typeface="Franklin Gothic Book" charset="0"/>
-                <a:cs typeface="Franklin Gothic Book" charset="0"/>
-              </a:defRPr>
-            </a:lvl5pPr>
-            <a:lvl6pPr marL="3847888" indent="-349807" algn="l" defTabSz="699614" rtl="0" eaLnBrk="1" latinLnBrk="0" hangingPunct="1">
-              <a:spcBef>
-                <a:spcPct val="20000"/>
-              </a:spcBef>
-              <a:buFont typeface="Arial"/>
-              <a:buChar char="•"/>
-              <a:defRPr sz="3022" kern="1200">
-                <a:solidFill>
-                  <a:schemeClr val="tx1"/>
-                </a:solidFill>
-                <a:latin typeface="+mn-lt"/>
-                <a:ea typeface="+mn-ea"/>
-                <a:cs typeface="+mn-cs"/>
-              </a:defRPr>
-            </a:lvl6pPr>
-            <a:lvl7pPr marL="4547505" indent="-349807" algn="l" defTabSz="699614" rtl="0" eaLnBrk="1" latinLnBrk="0" hangingPunct="1">
-              <a:spcBef>
-                <a:spcPct val="20000"/>
-              </a:spcBef>
-              <a:buFont typeface="Arial"/>
-              <a:buChar char="•"/>
-              <a:defRPr sz="3022" kern="1200">
-                <a:solidFill>
-                  <a:schemeClr val="tx1"/>
-                </a:solidFill>
-                <a:latin typeface="+mn-lt"/>
-                <a:ea typeface="+mn-ea"/>
-                <a:cs typeface="+mn-cs"/>
-              </a:defRPr>
-            </a:lvl7pPr>
-            <a:lvl8pPr marL="5247119" indent="-349807" algn="l" defTabSz="699614" rtl="0" eaLnBrk="1" latinLnBrk="0" hangingPunct="1">
-              <a:spcBef>
-                <a:spcPct val="20000"/>
-              </a:spcBef>
-              <a:buFont typeface="Arial"/>
-              <a:buChar char="•"/>
-              <a:defRPr sz="3022" kern="1200">
-                <a:solidFill>
-                  <a:schemeClr val="tx1"/>
-                </a:solidFill>
-                <a:latin typeface="+mn-lt"/>
-                <a:ea typeface="+mn-ea"/>
-                <a:cs typeface="+mn-cs"/>
-              </a:defRPr>
-            </a:lvl8pPr>
-            <a:lvl9pPr marL="5946736" indent="-349807" algn="l" defTabSz="699614" rtl="0" eaLnBrk="1" latinLnBrk="0" hangingPunct="1">
-              <a:spcBef>
-                <a:spcPct val="20000"/>
-              </a:spcBef>
-              <a:buFont typeface="Arial"/>
-              <a:buChar char="•"/>
-              <a:defRPr sz="3022" kern="1200">
-                <a:solidFill>
-                  <a:schemeClr val="tx1"/>
-                </a:solidFill>
-                <a:latin typeface="+mn-lt"/>
-                <a:ea typeface="+mn-ea"/>
-                <a:cs typeface="+mn-cs"/>
-              </a:defRPr>
-            </a:lvl9pPr>
-          </a:lstStyle>
-          <a:p>
-            <a:r>
-              <a:rPr lang="en-US" dirty="0"/>
-              <a:t>Objects</a:t>
-            </a:r>
-          </a:p>
-          <a:p>
-            <a:pPr lvl="1"/>
-            <a:r>
-              <a:rPr lang="en-US" dirty="0"/>
-              <a:t>Are “containers” </a:t>
-            </a:r>
-          </a:p>
-          <a:p>
-            <a:pPr lvl="1"/>
-            <a:r>
-              <a:rPr lang="en-US" dirty="0"/>
-              <a:t>Contain multiple primitives </a:t>
-            </a:r>
-          </a:p>
-          <a:p>
-            <a:pPr lvl="1"/>
-            <a:r>
-              <a:rPr lang="en-US" dirty="0"/>
-              <a:t>Related to the same ‘idea’</a:t>
-            </a:r>
-          </a:p>
-          <a:p>
-            <a:pPr lvl="1"/>
-            <a:r>
-              <a:rPr lang="en-US" dirty="0"/>
-              <a:t>Has functionality (methods) </a:t>
-            </a:r>
-          </a:p>
-          <a:p>
-            <a:pPr lvl="1"/>
-            <a:r>
-              <a:rPr lang="en-US" dirty="0"/>
-              <a:t>Extremely key to programming</a:t>
-            </a:r>
-          </a:p>
-          <a:p>
-            <a:pPr lvl="1"/>
-            <a:r>
-              <a:rPr lang="en-US" dirty="0"/>
-              <a:t>They are ‘smart’</a:t>
-            </a:r>
-          </a:p>
-          <a:p>
-            <a:endParaRPr lang="en-US" dirty="0"/>
-          </a:p>
-        </p:txBody>
-      </p:sp>
-      <p:pic>
-        <p:nvPicPr>
-          <p:cNvPr id="1026" name="Picture 2">
-            <a:extLst>
-              <a:ext uri="{FF2B5EF4-FFF2-40B4-BE49-F238E27FC236}">
-                <a16:creationId xmlns:a16="http://schemas.microsoft.com/office/drawing/2014/main" id="{06FF5B60-5DDD-5F45-8D73-5730D2645B7A}"/>
-              </a:ext>
-            </a:extLst>
-          </p:cNvPr>
-          <p:cNvPicPr>
-            <a:picLocks noChangeAspect="1" noChangeArrowheads="1"/>
-          </p:cNvPicPr>
-          <p:nvPr/>
-        </p:nvPicPr>
-        <p:blipFill>
-          <a:blip r:embed="rId2">
-            <a:extLst>
-              <a:ext uri="{28A0092B-C50C-407E-A947-70E740481C1C}">
-                <a14:useLocalDpi xmlns:a14="http://schemas.microsoft.com/office/drawing/2010/main" val="0"/>
-              </a:ext>
-            </a:extLst>
-          </a:blip>
-          <a:srcRect/>
-          <a:stretch>
-            <a:fillRect/>
-          </a:stretch>
-        </p:blipFill>
-        <p:spPr bwMode="auto">
-          <a:xfrm>
-            <a:off x="10508058" y="326595"/>
-            <a:ext cx="3128919" cy="2085946"/>
-          </a:xfrm>
-          <a:prstGeom prst="rect">
-            <a:avLst/>
-          </a:prstGeom>
-          <a:noFill/>
-          <a:extLst>
-            <a:ext uri="{909E8E84-426E-40DD-AFC4-6F175D3DCCD1}">
-              <a14:hiddenFill xmlns:a14="http://schemas.microsoft.com/office/drawing/2010/main">
-                <a:solidFill>
-                  <a:srgbClr val="FFFFFF"/>
-                </a:solidFill>
-              </a14:hiddenFill>
-            </a:ext>
-          </a:extLst>
-        </p:spPr>
-      </p:pic>
-    </p:spTree>
-    <p:extLst>
-      <p:ext uri="{BB962C8B-B14F-4D97-AF65-F5344CB8AC3E}">
-        <p14:creationId xmlns:p14="http://schemas.microsoft.com/office/powerpoint/2010/main" val="2544596636"/>
-      </p:ext>
-    </p:extLst>
-  </p:cSld>
-  <p:clrMapOvr>
-    <a:masterClrMapping/>
-  </p:clrMapOvr>
-  <mc:AlternateContent xmlns:mc="http://schemas.openxmlformats.org/markup-compatibility/2006" xmlns:p14="http://schemas.microsoft.com/office/powerpoint/2010/main">
-    <mc:Choice Requires="p14">
-      <p:transition p14:dur="300">
-        <p:fade/>
-      </p:transition>
-    </mc:Choice>
-    <mc:Fallback xmlns="">
-      <p:transition>
-        <p:fade/>
-      </p:transition>
-    </mc:Fallback>
-  </mc:AlternateContent>
-</p:sld>
-</file>
-
-<file path=ppt/slides/slide3.xml><?xml version="1.0" encoding="utf-8"?>
 <p:sld xmlns:a="http://schemas.openxmlformats.org/drawingml/2006/main" xmlns:r="http://schemas.openxmlformats.org/officeDocument/2006/relationships" xmlns:p="http://schemas.openxmlformats.org/presentationml/2006/main">
   <p:cSld>
     <p:spTree>
@@ -7588,14 +7112,14 @@
   <p:clrMapOvr>
     <a:masterClrMapping/>
   </p:clrMapOvr>
-  <mc:AlternateContent xmlns:mc="http://schemas.openxmlformats.org/markup-compatibility/2006" xmlns:p14="http://schemas.microsoft.com/office/powerpoint/2010/main">
-    <mc:Choice Requires="p14">
-      <p:transition p14:dur="300">
+  <mc:AlternateContent xmlns:mc="http://schemas.openxmlformats.org/markup-compatibility/2006">
+    <mc:Choice xmlns:p14="http://schemas.microsoft.com/office/powerpoint/2010/main" Requires="p14">
+      <p:transition p14:dur="300" advTm="61612">
         <p:fade/>
       </p:transition>
     </mc:Choice>
-    <mc:Fallback xmlns="">
-      <p:transition>
+    <mc:Fallback>
+      <p:transition advTm="61612">
         <p:fade/>
       </p:transition>
     </mc:Fallback>
@@ -7603,7 +7127,7 @@
 </p:sld>
 </file>
 
-<file path=ppt/slides/slide4.xml><?xml version="1.0" encoding="utf-8"?>
+<file path=ppt/slides/slide3.xml><?xml version="1.0" encoding="utf-8"?>
 <p:sld xmlns:a="http://schemas.openxmlformats.org/drawingml/2006/main" xmlns:r="http://schemas.openxmlformats.org/officeDocument/2006/relationships" xmlns:p="http://schemas.openxmlformats.org/presentationml/2006/main">
   <p:cSld>
     <p:spTree>
@@ -9730,6 +9254,9 @@
         </p:txBody>
       </p:sp>
     </p:spTree>
+    <p:custDataLst>
+      <p:tags r:id="rId1"/>
+    </p:custDataLst>
     <p:extLst>
       <p:ext uri="{BB962C8B-B14F-4D97-AF65-F5344CB8AC3E}">
         <p14:creationId xmlns:p14="http://schemas.microsoft.com/office/powerpoint/2010/main" val="945460295"/>
@@ -9739,14 +9266,14 @@
   <p:clrMapOvr>
     <a:masterClrMapping/>
   </p:clrMapOvr>
-  <mc:AlternateContent xmlns:mc="http://schemas.openxmlformats.org/markup-compatibility/2006" xmlns:p14="http://schemas.microsoft.com/office/powerpoint/2010/main">
-    <mc:Choice Requires="p14">
-      <p:transition p14:dur="300">
+  <mc:AlternateContent xmlns:mc="http://schemas.openxmlformats.org/markup-compatibility/2006">
+    <mc:Choice xmlns:p14="http://schemas.microsoft.com/office/powerpoint/2010/main" Requires="p14">
+      <p:transition p14:dur="300" advTm="135521">
         <p:fade/>
       </p:transition>
     </mc:Choice>
-    <mc:Fallback xmlns="">
-      <p:transition>
+    <mc:Fallback>
+      <p:transition advTm="135521">
         <p:fade/>
       </p:transition>
     </mc:Fallback>
@@ -10415,7 +9942,7 @@
 </p:sld>
 </file>
 
-<file path=ppt/slides/slide5.xml><?xml version="1.0" encoding="utf-8"?>
+<file path=ppt/slides/slide4.xml><?xml version="1.0" encoding="utf-8"?>
 <p:sld xmlns:a="http://schemas.openxmlformats.org/drawingml/2006/main" xmlns:r="http://schemas.openxmlformats.org/officeDocument/2006/relationships" xmlns:p="http://schemas.openxmlformats.org/presentationml/2006/main">
   <p:cSld>
     <p:spTree>
@@ -10548,7 +10075,7 @@
         </p:nvSpPr>
         <p:spPr>
           <a:xfrm>
-            <a:off x="142407" y="1518819"/>
+            <a:off x="628075" y="1546168"/>
             <a:ext cx="6910464" cy="5016758"/>
           </a:xfrm>
           <a:prstGeom prst="rect">
@@ -11390,14 +10917,14 @@
   <p:clrMapOvr>
     <a:masterClrMapping/>
   </p:clrMapOvr>
-  <mc:AlternateContent xmlns:mc="http://schemas.openxmlformats.org/markup-compatibility/2006" xmlns:p14="http://schemas.microsoft.com/office/powerpoint/2010/main">
-    <mc:Choice Requires="p14">
-      <p:transition p14:dur="300">
+  <mc:AlternateContent xmlns:mc="http://schemas.openxmlformats.org/markup-compatibility/2006">
+    <mc:Choice xmlns:p14="http://schemas.microsoft.com/office/powerpoint/2010/main" Requires="p14">
+      <p:transition p14:dur="300" advTm="193872">
         <p:fade/>
       </p:transition>
     </mc:Choice>
-    <mc:Fallback xmlns="">
-      <p:transition>
+    <mc:Fallback>
+      <p:transition advTm="193872">
         <p:fade/>
       </p:transition>
     </mc:Fallback>
@@ -11405,7 +10932,7 @@
 </p:sld>
 </file>
 
-<file path=ppt/slides/slide6.xml><?xml version="1.0" encoding="utf-8"?>
+<file path=ppt/slides/slide5.xml><?xml version="1.0" encoding="utf-8"?>
 <p:sld xmlns:a="http://schemas.openxmlformats.org/drawingml/2006/main" xmlns:r="http://schemas.openxmlformats.org/officeDocument/2006/relationships" xmlns:p="http://schemas.openxmlformats.org/presentationml/2006/main">
   <p:cSld>
     <p:spTree>
@@ -12100,14 +11627,14 @@
   <p:clrMapOvr>
     <a:masterClrMapping/>
   </p:clrMapOvr>
-  <mc:AlternateContent xmlns:mc="http://schemas.openxmlformats.org/markup-compatibility/2006" xmlns:p14="http://schemas.microsoft.com/office/powerpoint/2010/main">
-    <mc:Choice Requires="p14">
-      <p:transition p14:dur="300">
+  <mc:AlternateContent xmlns:mc="http://schemas.openxmlformats.org/markup-compatibility/2006">
+    <mc:Choice xmlns:p14="http://schemas.microsoft.com/office/powerpoint/2010/main" Requires="p14">
+      <p:transition p14:dur="300" advTm="69576">
         <p:fade/>
       </p:transition>
     </mc:Choice>
-    <mc:Fallback xmlns="">
-      <p:transition>
+    <mc:Fallback>
+      <p:transition advTm="69576">
         <p:fade/>
       </p:transition>
     </mc:Fallback>
@@ -12115,7 +11642,7 @@
 </p:sld>
 </file>
 
-<file path=ppt/slides/slide7.xml><?xml version="1.0" encoding="utf-8"?>
+<file path=ppt/slides/slide6.xml><?xml version="1.0" encoding="utf-8"?>
 <p:sld xmlns:a="http://schemas.openxmlformats.org/drawingml/2006/main" xmlns:r="http://schemas.openxmlformats.org/officeDocument/2006/relationships" xmlns:p="http://schemas.openxmlformats.org/presentationml/2006/main">
   <p:cSld>
     <p:spTree>
@@ -13325,6 +12852,9 @@
         </p:txBody>
       </p:sp>
     </p:spTree>
+    <p:custDataLst>
+      <p:tags r:id="rId1"/>
+    </p:custDataLst>
     <p:extLst>
       <p:ext uri="{BB962C8B-B14F-4D97-AF65-F5344CB8AC3E}">
         <p14:creationId xmlns:p14="http://schemas.microsoft.com/office/powerpoint/2010/main" val="2539599477"/>
@@ -13334,14 +12864,14 @@
   <p:clrMapOvr>
     <a:masterClrMapping/>
   </p:clrMapOvr>
-  <mc:AlternateContent xmlns:mc="http://schemas.openxmlformats.org/markup-compatibility/2006" xmlns:p14="http://schemas.microsoft.com/office/powerpoint/2010/main">
-    <mc:Choice Requires="p14">
-      <p:transition p14:dur="300">
+  <mc:AlternateContent xmlns:mc="http://schemas.openxmlformats.org/markup-compatibility/2006">
+    <mc:Choice xmlns:p14="http://schemas.microsoft.com/office/powerpoint/2010/main" Requires="p14">
+      <p:transition p14:dur="300" advTm="133879">
         <p:fade/>
       </p:transition>
     </mc:Choice>
-    <mc:Fallback xmlns="">
-      <p:transition>
+    <mc:Fallback>
+      <p:transition advTm="133879">
         <p:fade/>
       </p:transition>
     </mc:Fallback>
@@ -13556,6 +13086,18 @@
     </p:bldLst>
   </p:timing>
 </p:sld>
+</file>
+
+<file path=ppt/tags/tag1.xml><?xml version="1.0" encoding="utf-8"?>
+<p:tagLst xmlns:a="http://schemas.openxmlformats.org/drawingml/2006/main" xmlns:r="http://schemas.openxmlformats.org/officeDocument/2006/relationships" xmlns:p="http://schemas.openxmlformats.org/presentationml/2006/main">
+  <p:tag name="TIMING" val="|43.2|6.7|16.5|29.7"/>
+</p:tagLst>
+</file>
+
+<file path=ppt/tags/tag2.xml><?xml version="1.0" encoding="utf-8"?>
+<p:tagLst xmlns:a="http://schemas.openxmlformats.org/drawingml/2006/main" xmlns:r="http://schemas.openxmlformats.org/officeDocument/2006/relationships" xmlns:p="http://schemas.openxmlformats.org/presentationml/2006/main">
+  <p:tag name="TIMING" val="|28.5|45.9"/>
+</p:tagLst>
 </file>
 
 <file path=ppt/theme/theme1.xml><?xml version="1.0" encoding="utf-8"?>

</xml_diff>